<commit_message>
Fixed the thumbnail from old file and changed transition effects
</commit_message>
<xml_diff>
--- a/Hell Quiz.pptx
+++ b/Hell Quiz.pptx
@@ -840,7 +840,7 @@
           <a:p>
             <a:fld id="{6B85D64B-50B8-4AEF-9C70-551A5D872A40}" type="datetimeFigureOut">
               <a:rPr lang="bg-BG" smtClean="0"/>
-              <a:t>3.3.2015 г.</a:t>
+              <a:t>4.3.2015 г.</a:t>
             </a:fld>
             <a:endParaRPr lang="bg-BG"/>
           </a:p>
@@ -898,18 +898,9 @@
   <p:clrMapOvr>
     <a:masterClrMapping/>
   </p:clrMapOvr>
-  <mc:AlternateContent xmlns:mc="http://schemas.openxmlformats.org/markup-compatibility/2006" xmlns:p14="http://schemas.microsoft.com/office/powerpoint/2010/main">
-    <mc:Choice Requires="p14">
-      <p:transition spd="slow" p14:dur="4000">
-        <p14:vortex dir="r"/>
-      </p:transition>
-    </mc:Choice>
-    <mc:Fallback xmlns="">
-      <p:transition spd="slow">
-        <p:fade/>
-      </p:transition>
-    </mc:Fallback>
-  </mc:AlternateContent>
+  <p:transition spd="slow">
+    <p:push dir="u"/>
+  </p:transition>
 </p:sldLayout>
 </file>
 
@@ -1103,7 +1094,7 @@
           <a:p>
             <a:fld id="{6B85D64B-50B8-4AEF-9C70-551A5D872A40}" type="datetimeFigureOut">
               <a:rPr lang="bg-BG" smtClean="0"/>
-              <a:t>3.3.2015 г.</a:t>
+              <a:t>4.3.2015 г.</a:t>
             </a:fld>
             <a:endParaRPr lang="bg-BG"/>
           </a:p>
@@ -1161,18 +1152,9 @@
   <p:clrMapOvr>
     <a:masterClrMapping/>
   </p:clrMapOvr>
-  <mc:AlternateContent xmlns:mc="http://schemas.openxmlformats.org/markup-compatibility/2006" xmlns:p14="http://schemas.microsoft.com/office/powerpoint/2010/main">
-    <mc:Choice Requires="p14">
-      <p:transition spd="slow" p14:dur="4000">
-        <p14:vortex dir="r"/>
-      </p:transition>
-    </mc:Choice>
-    <mc:Fallback xmlns="">
-      <p:transition spd="slow">
-        <p:fade/>
-      </p:transition>
-    </mc:Fallback>
-  </mc:AlternateContent>
+  <p:transition spd="slow">
+    <p:push dir="u"/>
+  </p:transition>
 </p:sldLayout>
 </file>
 
@@ -1429,7 +1411,7 @@
           <a:p>
             <a:fld id="{6B85D64B-50B8-4AEF-9C70-551A5D872A40}" type="datetimeFigureOut">
               <a:rPr lang="bg-BG" smtClean="0"/>
-              <a:t>3.3.2015 г.</a:t>
+              <a:t>4.3.2015 г.</a:t>
             </a:fld>
             <a:endParaRPr lang="bg-BG"/>
           </a:p>
@@ -1577,18 +1559,9 @@
   <p:clrMapOvr>
     <a:masterClrMapping/>
   </p:clrMapOvr>
-  <mc:AlternateContent xmlns:mc="http://schemas.openxmlformats.org/markup-compatibility/2006" xmlns:p14="http://schemas.microsoft.com/office/powerpoint/2010/main">
-    <mc:Choice Requires="p14">
-      <p:transition spd="slow" p14:dur="4000">
-        <p14:vortex dir="r"/>
-      </p:transition>
-    </mc:Choice>
-    <mc:Fallback xmlns="">
-      <p:transition spd="slow">
-        <p:fade/>
-      </p:transition>
-    </mc:Fallback>
-  </mc:AlternateContent>
+  <p:transition spd="slow">
+    <p:push dir="u"/>
+  </p:transition>
 </p:sldLayout>
 </file>
 
@@ -1782,7 +1755,7 @@
           <a:p>
             <a:fld id="{6B85D64B-50B8-4AEF-9C70-551A5D872A40}" type="datetimeFigureOut">
               <a:rPr lang="bg-BG" smtClean="0"/>
-              <a:t>3.3.2015 г.</a:t>
+              <a:t>4.3.2015 г.</a:t>
             </a:fld>
             <a:endParaRPr lang="bg-BG"/>
           </a:p>
@@ -1840,18 +1813,9 @@
   <p:clrMapOvr>
     <a:masterClrMapping/>
   </p:clrMapOvr>
-  <mc:AlternateContent xmlns:mc="http://schemas.openxmlformats.org/markup-compatibility/2006" xmlns:p14="http://schemas.microsoft.com/office/powerpoint/2010/main">
-    <mc:Choice Requires="p14">
-      <p:transition spd="slow" p14:dur="4000">
-        <p14:vortex dir="r"/>
-      </p:transition>
-    </mc:Choice>
-    <mc:Fallback xmlns="">
-      <p:transition spd="slow">
-        <p:fade/>
-      </p:transition>
-    </mc:Fallback>
-  </mc:AlternateContent>
+  <p:transition spd="slow">
+    <p:push dir="u"/>
+  </p:transition>
 </p:sldLayout>
 </file>
 
@@ -2108,7 +2072,7 @@
           <a:p>
             <a:fld id="{6B85D64B-50B8-4AEF-9C70-551A5D872A40}" type="datetimeFigureOut">
               <a:rPr lang="bg-BG" smtClean="0"/>
-              <a:t>3.3.2015 г.</a:t>
+              <a:t>4.3.2015 г.</a:t>
             </a:fld>
             <a:endParaRPr lang="bg-BG"/>
           </a:p>
@@ -2248,18 +2212,9 @@
   <p:clrMapOvr>
     <a:masterClrMapping/>
   </p:clrMapOvr>
-  <mc:AlternateContent xmlns:mc="http://schemas.openxmlformats.org/markup-compatibility/2006" xmlns:p14="http://schemas.microsoft.com/office/powerpoint/2010/main">
-    <mc:Choice Requires="p14">
-      <p:transition spd="slow" p14:dur="4000">
-        <p14:vortex dir="r"/>
-      </p:transition>
-    </mc:Choice>
-    <mc:Fallback xmlns="">
-      <p:transition spd="slow">
-        <p:fade/>
-      </p:transition>
-    </mc:Fallback>
-  </mc:AlternateContent>
+  <p:transition spd="slow">
+    <p:push dir="u"/>
+  </p:transition>
 </p:sldLayout>
 </file>
 
@@ -2513,7 +2468,7 @@
           <a:p>
             <a:fld id="{6B85D64B-50B8-4AEF-9C70-551A5D872A40}" type="datetimeFigureOut">
               <a:rPr lang="bg-BG" smtClean="0"/>
-              <a:t>3.3.2015 г.</a:t>
+              <a:t>4.3.2015 г.</a:t>
             </a:fld>
             <a:endParaRPr lang="bg-BG"/>
           </a:p>
@@ -2571,18 +2526,9 @@
   <p:clrMapOvr>
     <a:masterClrMapping/>
   </p:clrMapOvr>
-  <mc:AlternateContent xmlns:mc="http://schemas.openxmlformats.org/markup-compatibility/2006" xmlns:p14="http://schemas.microsoft.com/office/powerpoint/2010/main">
-    <mc:Choice Requires="p14">
-      <p:transition spd="slow" p14:dur="4000">
-        <p14:vortex dir="r"/>
-      </p:transition>
-    </mc:Choice>
-    <mc:Fallback xmlns="">
-      <p:transition spd="slow">
-        <p:fade/>
-      </p:transition>
-    </mc:Fallback>
-  </mc:AlternateContent>
+  <p:transition spd="slow">
+    <p:push dir="u"/>
+  </p:transition>
 </p:sldLayout>
 </file>
 
@@ -2695,7 +2641,7 @@
           <a:p>
             <a:fld id="{6B85D64B-50B8-4AEF-9C70-551A5D872A40}" type="datetimeFigureOut">
               <a:rPr lang="bg-BG" smtClean="0"/>
-              <a:t>3.3.2015 г.</a:t>
+              <a:t>4.3.2015 г.</a:t>
             </a:fld>
             <a:endParaRPr lang="bg-BG"/>
           </a:p>
@@ -2753,18 +2699,9 @@
   <p:clrMapOvr>
     <a:masterClrMapping/>
   </p:clrMapOvr>
-  <mc:AlternateContent xmlns:mc="http://schemas.openxmlformats.org/markup-compatibility/2006" xmlns:p14="http://schemas.microsoft.com/office/powerpoint/2010/main">
-    <mc:Choice Requires="p14">
-      <p:transition spd="slow" p14:dur="4000">
-        <p14:vortex dir="r"/>
-      </p:transition>
-    </mc:Choice>
-    <mc:Fallback xmlns="">
-      <p:transition spd="slow">
-        <p:fade/>
-      </p:transition>
-    </mc:Fallback>
-  </mc:AlternateContent>
+  <p:transition spd="slow">
+    <p:push dir="u"/>
+  </p:transition>
 </p:sldLayout>
 </file>
 
@@ -2887,7 +2824,7 @@
           <a:p>
             <a:fld id="{6B85D64B-50B8-4AEF-9C70-551A5D872A40}" type="datetimeFigureOut">
               <a:rPr lang="bg-BG" smtClean="0"/>
-              <a:t>3.3.2015 г.</a:t>
+              <a:t>4.3.2015 г.</a:t>
             </a:fld>
             <a:endParaRPr lang="bg-BG"/>
           </a:p>
@@ -2945,18 +2882,9 @@
   <p:clrMapOvr>
     <a:masterClrMapping/>
   </p:clrMapOvr>
-  <mc:AlternateContent xmlns:mc="http://schemas.openxmlformats.org/markup-compatibility/2006" xmlns:p14="http://schemas.microsoft.com/office/powerpoint/2010/main">
-    <mc:Choice Requires="p14">
-      <p:transition spd="slow" p14:dur="4000">
-        <p14:vortex dir="r"/>
-      </p:transition>
-    </mc:Choice>
-    <mc:Fallback xmlns="">
-      <p:transition spd="slow">
-        <p:fade/>
-      </p:transition>
-    </mc:Fallback>
-  </mc:AlternateContent>
+  <p:transition spd="slow">
+    <p:push dir="u"/>
+  </p:transition>
 </p:sldLayout>
 </file>
 
@@ -3075,7 +3003,7 @@
           <a:p>
             <a:fld id="{6B85D64B-50B8-4AEF-9C70-551A5D872A40}" type="datetimeFigureOut">
               <a:rPr lang="bg-BG" smtClean="0"/>
-              <a:t>3.3.2015 г.</a:t>
+              <a:t>4.3.2015 г.</a:t>
             </a:fld>
             <a:endParaRPr lang="bg-BG"/>
           </a:p>
@@ -3133,18 +3061,9 @@
   <p:clrMapOvr>
     <a:masterClrMapping/>
   </p:clrMapOvr>
-  <mc:AlternateContent xmlns:mc="http://schemas.openxmlformats.org/markup-compatibility/2006" xmlns:p14="http://schemas.microsoft.com/office/powerpoint/2010/main">
-    <mc:Choice Requires="p14">
-      <p:transition spd="slow" p14:dur="4000">
-        <p14:vortex dir="r"/>
-      </p:transition>
-    </mc:Choice>
-    <mc:Fallback xmlns="">
-      <p:transition spd="slow">
-        <p:fade/>
-      </p:transition>
-    </mc:Fallback>
-  </mc:AlternateContent>
+  <p:transition spd="slow">
+    <p:push dir="u"/>
+  </p:transition>
 </p:sldLayout>
 </file>
 
@@ -3334,7 +3253,7 @@
           <a:p>
             <a:fld id="{6B85D64B-50B8-4AEF-9C70-551A5D872A40}" type="datetimeFigureOut">
               <a:rPr lang="bg-BG" smtClean="0"/>
-              <a:t>3.3.2015 г.</a:t>
+              <a:t>4.3.2015 г.</a:t>
             </a:fld>
             <a:endParaRPr lang="bg-BG"/>
           </a:p>
@@ -3392,18 +3311,9 @@
   <p:clrMapOvr>
     <a:masterClrMapping/>
   </p:clrMapOvr>
-  <mc:AlternateContent xmlns:mc="http://schemas.openxmlformats.org/markup-compatibility/2006" xmlns:p14="http://schemas.microsoft.com/office/powerpoint/2010/main">
-    <mc:Choice Requires="p14">
-      <p:transition spd="slow" p14:dur="4000">
-        <p14:vortex dir="r"/>
-      </p:transition>
-    </mc:Choice>
-    <mc:Fallback xmlns="">
-      <p:transition spd="slow">
-        <p:fade/>
-      </p:transition>
-    </mc:Fallback>
-  </mc:AlternateContent>
+  <p:transition spd="slow">
+    <p:push dir="u"/>
+  </p:transition>
 </p:sldLayout>
 </file>
 
@@ -3578,7 +3488,7 @@
           <a:p>
             <a:fld id="{6B85D64B-50B8-4AEF-9C70-551A5D872A40}" type="datetimeFigureOut">
               <a:rPr lang="bg-BG" smtClean="0"/>
-              <a:t>3.3.2015 г.</a:t>
+              <a:t>4.3.2015 г.</a:t>
             </a:fld>
             <a:endParaRPr lang="bg-BG"/>
           </a:p>
@@ -3636,18 +3546,9 @@
   <p:clrMapOvr>
     <a:masterClrMapping/>
   </p:clrMapOvr>
-  <mc:AlternateContent xmlns:mc="http://schemas.openxmlformats.org/markup-compatibility/2006" xmlns:p14="http://schemas.microsoft.com/office/powerpoint/2010/main">
-    <mc:Choice Requires="p14">
-      <p:transition spd="slow" p14:dur="4000">
-        <p14:vortex dir="r"/>
-      </p:transition>
-    </mc:Choice>
-    <mc:Fallback xmlns="">
-      <p:transition spd="slow">
-        <p:fade/>
-      </p:transition>
-    </mc:Fallback>
-  </mc:AlternateContent>
+  <p:transition spd="slow">
+    <p:push dir="u"/>
+  </p:transition>
 </p:sldLayout>
 </file>
 
@@ -3964,7 +3865,7 @@
           <a:p>
             <a:fld id="{6B85D64B-50B8-4AEF-9C70-551A5D872A40}" type="datetimeFigureOut">
               <a:rPr lang="bg-BG" smtClean="0"/>
-              <a:t>3.3.2015 г.</a:t>
+              <a:t>4.3.2015 г.</a:t>
             </a:fld>
             <a:endParaRPr lang="bg-BG"/>
           </a:p>
@@ -4022,18 +3923,9 @@
   <p:clrMapOvr>
     <a:masterClrMapping/>
   </p:clrMapOvr>
-  <mc:AlternateContent xmlns:mc="http://schemas.openxmlformats.org/markup-compatibility/2006" xmlns:p14="http://schemas.microsoft.com/office/powerpoint/2010/main">
-    <mc:Choice Requires="p14">
-      <p:transition spd="slow" p14:dur="4000">
-        <p14:vortex dir="r"/>
-      </p:transition>
-    </mc:Choice>
-    <mc:Fallback xmlns="">
-      <p:transition spd="slow">
-        <p:fade/>
-      </p:transition>
-    </mc:Fallback>
-  </mc:AlternateContent>
+  <p:transition spd="slow">
+    <p:push dir="u"/>
+  </p:transition>
 </p:sldLayout>
 </file>
 
@@ -4099,7 +3991,7 @@
           <a:p>
             <a:fld id="{6B85D64B-50B8-4AEF-9C70-551A5D872A40}" type="datetimeFigureOut">
               <a:rPr lang="bg-BG" smtClean="0"/>
-              <a:t>3.3.2015 г.</a:t>
+              <a:t>4.3.2015 г.</a:t>
             </a:fld>
             <a:endParaRPr lang="bg-BG"/>
           </a:p>
@@ -4157,18 +4049,9 @@
   <p:clrMapOvr>
     <a:masterClrMapping/>
   </p:clrMapOvr>
-  <mc:AlternateContent xmlns:mc="http://schemas.openxmlformats.org/markup-compatibility/2006" xmlns:p14="http://schemas.microsoft.com/office/powerpoint/2010/main">
-    <mc:Choice Requires="p14">
-      <p:transition spd="slow" p14:dur="4000">
-        <p14:vortex dir="r"/>
-      </p:transition>
-    </mc:Choice>
-    <mc:Fallback xmlns="">
-      <p:transition spd="slow">
-        <p:fade/>
-      </p:transition>
-    </mc:Fallback>
-  </mc:AlternateContent>
+  <p:transition spd="slow">
+    <p:push dir="u"/>
+  </p:transition>
 </p:sldLayout>
 </file>
 
@@ -4206,7 +4089,7 @@
           <a:p>
             <a:fld id="{6B85D64B-50B8-4AEF-9C70-551A5D872A40}" type="datetimeFigureOut">
               <a:rPr lang="bg-BG" smtClean="0"/>
-              <a:t>3.3.2015 г.</a:t>
+              <a:t>4.3.2015 г.</a:t>
             </a:fld>
             <a:endParaRPr lang="bg-BG"/>
           </a:p>
@@ -4264,18 +4147,9 @@
   <p:clrMapOvr>
     <a:masterClrMapping/>
   </p:clrMapOvr>
-  <mc:AlternateContent xmlns:mc="http://schemas.openxmlformats.org/markup-compatibility/2006" xmlns:p14="http://schemas.microsoft.com/office/powerpoint/2010/main">
-    <mc:Choice Requires="p14">
-      <p:transition spd="slow" p14:dur="4000">
-        <p14:vortex dir="r"/>
-      </p:transition>
-    </mc:Choice>
-    <mc:Fallback xmlns="">
-      <p:transition spd="slow">
-        <p:fade/>
-      </p:transition>
-    </mc:Fallback>
-  </mc:AlternateContent>
+  <p:transition spd="slow">
+    <p:push dir="u"/>
+  </p:transition>
 </p:sldLayout>
 </file>
 
@@ -4473,7 +4347,7 @@
           <a:p>
             <a:fld id="{6B85D64B-50B8-4AEF-9C70-551A5D872A40}" type="datetimeFigureOut">
               <a:rPr lang="bg-BG" smtClean="0"/>
-              <a:t>3.3.2015 г.</a:t>
+              <a:t>4.3.2015 г.</a:t>
             </a:fld>
             <a:endParaRPr lang="bg-BG"/>
           </a:p>
@@ -4531,18 +4405,9 @@
   <p:clrMapOvr>
     <a:masterClrMapping/>
   </p:clrMapOvr>
-  <mc:AlternateContent xmlns:mc="http://schemas.openxmlformats.org/markup-compatibility/2006" xmlns:p14="http://schemas.microsoft.com/office/powerpoint/2010/main">
-    <mc:Choice Requires="p14">
-      <p:transition spd="slow" p14:dur="4000">
-        <p14:vortex dir="r"/>
-      </p:transition>
-    </mc:Choice>
-    <mc:Fallback xmlns="">
-      <p:transition spd="slow">
-        <p:fade/>
-      </p:transition>
-    </mc:Fallback>
-  </mc:AlternateContent>
+  <p:transition spd="slow">
+    <p:push dir="u"/>
+  </p:transition>
 </p:sldLayout>
 </file>
 
@@ -4748,7 +4613,7 @@
           <a:p>
             <a:fld id="{6B85D64B-50B8-4AEF-9C70-551A5D872A40}" type="datetimeFigureOut">
               <a:rPr lang="bg-BG" smtClean="0"/>
-              <a:t>3.3.2015 г.</a:t>
+              <a:t>4.3.2015 г.</a:t>
             </a:fld>
             <a:endParaRPr lang="bg-BG"/>
           </a:p>
@@ -4806,18 +4671,9 @@
   <p:clrMapOvr>
     <a:masterClrMapping/>
   </p:clrMapOvr>
-  <mc:AlternateContent xmlns:mc="http://schemas.openxmlformats.org/markup-compatibility/2006" xmlns:p14="http://schemas.microsoft.com/office/powerpoint/2010/main">
-    <mc:Choice Requires="p14">
-      <p:transition spd="slow" p14:dur="4000">
-        <p14:vortex dir="r"/>
-      </p:transition>
-    </mc:Choice>
-    <mc:Fallback xmlns="">
-      <p:transition spd="slow">
-        <p:fade/>
-      </p:transition>
-    </mc:Fallback>
-  </mc:AlternateContent>
+  <p:transition spd="slow">
+    <p:push dir="u"/>
+  </p:transition>
 </p:sldLayout>
 </file>
 
@@ -5503,7 +5359,7 @@
           <a:p>
             <a:fld id="{6B85D64B-50B8-4AEF-9C70-551A5D872A40}" type="datetimeFigureOut">
               <a:rPr lang="bg-BG" smtClean="0"/>
-              <a:t>3.3.2015 г.</a:t>
+              <a:t>4.3.2015 г.</a:t>
             </a:fld>
             <a:endParaRPr lang="bg-BG"/>
           </a:p>
@@ -5611,18 +5467,9 @@
     <p:sldLayoutId id="2147483692" r:id="rId15"/>
     <p:sldLayoutId id="2147483693" r:id="rId16"/>
   </p:sldLayoutIdLst>
-  <mc:AlternateContent xmlns:mc="http://schemas.openxmlformats.org/markup-compatibility/2006" xmlns:p14="http://schemas.microsoft.com/office/powerpoint/2010/main">
-    <mc:Choice Requires="p14">
-      <p:transition spd="slow" p14:dur="4000">
-        <p14:vortex dir="r"/>
-      </p:transition>
-    </mc:Choice>
-    <mc:Fallback xmlns="">
-      <p:transition spd="slow">
-        <p:fade/>
-      </p:transition>
-    </mc:Fallback>
-  </mc:AlternateContent>
+  <p:transition spd="slow">
+    <p:push dir="u"/>
+  </p:transition>
   <p:txStyles>
     <p:titleStyle>
       <a:lvl1pPr algn="l" defTabSz="457200" rtl="0" eaLnBrk="1" latinLnBrk="0" hangingPunct="1">
@@ -6090,17 +5937,8 @@
           <a:p>
             <a:r>
               <a:rPr lang="en-US" dirty="0" smtClean="0"/>
-              <a:t>2015 </a:t>
-            </a:r>
-            <a:r>
-              <a:rPr lang="en-US" dirty="0" smtClean="0"/>
-              <a:t>C# Part 2 Team </a:t>
-            </a:r>
-            <a:r>
-              <a:rPr lang="en-US" dirty="0" smtClean="0"/>
-              <a:t>“Ogre Mage”</a:t>
-            </a:r>
-            <a:endParaRPr lang="en-US" dirty="0" smtClean="0"/>
+              <a:t>2015 C# Part 2 Team “Ogre Mage”</a:t>
+            </a:r>
           </a:p>
           <a:p>
             <a:r>
@@ -6417,18 +6255,9 @@
   <p:clrMapOvr>
     <a:masterClrMapping/>
   </p:clrMapOvr>
-  <mc:AlternateContent xmlns:mc="http://schemas.openxmlformats.org/markup-compatibility/2006" xmlns:p14="http://schemas.microsoft.com/office/powerpoint/2010/main">
-    <mc:Choice Requires="p14">
-      <p:transition spd="slow" p14:dur="4000">
-        <p14:vortex dir="r"/>
-      </p:transition>
-    </mc:Choice>
-    <mc:Fallback xmlns="">
-      <p:transition spd="slow">
-        <p:fade/>
-      </p:transition>
-    </mc:Fallback>
-  </mc:AlternateContent>
+  <p:transition spd="slow">
+    <p:push dir="u"/>
+  </p:transition>
   <p:timing>
     <p:tnLst>
       <p:par>
@@ -6731,18 +6560,9 @@
   <p:clrMapOvr>
     <a:masterClrMapping/>
   </p:clrMapOvr>
-  <mc:AlternateContent xmlns:mc="http://schemas.openxmlformats.org/markup-compatibility/2006" xmlns:p14="http://schemas.microsoft.com/office/powerpoint/2010/main">
-    <mc:Choice Requires="p14">
-      <p:transition spd="slow" p14:dur="4000">
-        <p14:vortex dir="r"/>
-      </p:transition>
-    </mc:Choice>
-    <mc:Fallback xmlns="">
-      <p:transition spd="slow">
-        <p:fade/>
-      </p:transition>
-    </mc:Fallback>
-  </mc:AlternateContent>
+  <p:transition spd="slow">
+    <p:push dir="u"/>
+  </p:transition>
   <p:timing>
     <p:tnLst>
       <p:par>
@@ -6873,7 +6693,6 @@
               <a:rPr lang="en-US" dirty="0" smtClean="0"/>
               <a:t>Academy Meetings</a:t>
             </a:r>
-            <a:endParaRPr lang="en-US" dirty="0" smtClean="0"/>
           </a:p>
           <a:p>
             <a:endParaRPr lang="en-US" dirty="0" smtClean="0"/>
@@ -6923,18 +6742,9 @@
   <p:clrMapOvr>
     <a:masterClrMapping/>
   </p:clrMapOvr>
-  <mc:AlternateContent xmlns:mc="http://schemas.openxmlformats.org/markup-compatibility/2006" xmlns:p14="http://schemas.microsoft.com/office/powerpoint/2010/main">
-    <mc:Choice Requires="p14">
-      <p:transition spd="slow" p14:dur="4000">
-        <p14:vortex dir="r"/>
-      </p:transition>
-    </mc:Choice>
-    <mc:Fallback xmlns="">
-      <p:transition spd="slow">
-        <p:fade/>
-      </p:transition>
-    </mc:Fallback>
-  </mc:AlternateContent>
+  <p:transition spd="slow">
+    <p:push dir="u"/>
+  </p:transition>
   <p:timing>
     <p:tnLst>
       <p:par>
@@ -7092,18 +6902,9 @@
   <p:clrMapOvr>
     <a:masterClrMapping/>
   </p:clrMapOvr>
-  <mc:AlternateContent xmlns:mc="http://schemas.openxmlformats.org/markup-compatibility/2006" xmlns:p14="http://schemas.microsoft.com/office/powerpoint/2010/main">
-    <mc:Choice Requires="p14">
-      <p:transition spd="slow" p14:dur="4000">
-        <p14:vortex dir="r"/>
-      </p:transition>
-    </mc:Choice>
-    <mc:Fallback xmlns="">
-      <p:transition spd="slow">
-        <p:fade/>
-      </p:transition>
-    </mc:Fallback>
-  </mc:AlternateContent>
+  <p:transition spd="slow">
+    <p:push dir="u"/>
+  </p:transition>
   <p:timing>
     <p:tnLst>
       <p:par>
@@ -7247,18 +7048,9 @@
   <p:clrMapOvr>
     <a:masterClrMapping/>
   </p:clrMapOvr>
-  <mc:AlternateContent xmlns:mc="http://schemas.openxmlformats.org/markup-compatibility/2006" xmlns:p14="http://schemas.microsoft.com/office/powerpoint/2010/main">
-    <mc:Choice Requires="p14">
-      <p:transition spd="slow" p14:dur="4000">
-        <p14:vortex dir="r"/>
-      </p:transition>
-    </mc:Choice>
-    <mc:Fallback xmlns="">
-      <p:transition spd="slow">
-        <p:fade/>
-      </p:transition>
-    </mc:Fallback>
-  </mc:AlternateContent>
+  <p:transition spd="slow">
+    <p:push dir="u"/>
+  </p:transition>
   <p:timing>
     <p:tnLst>
       <p:par>
@@ -7333,28 +7125,24 @@
               <a:rPr lang="en-US" dirty="0" smtClean="0"/>
               <a:t>Answer questions</a:t>
             </a:r>
-            <a:endParaRPr lang="en-US" dirty="0" smtClean="0"/>
           </a:p>
           <a:p>
             <a:r>
               <a:rPr lang="en-US" dirty="0" smtClean="0"/>
               <a:t>Avoid obstacles</a:t>
             </a:r>
-            <a:endParaRPr lang="en-US" dirty="0" smtClean="0"/>
           </a:p>
           <a:p>
             <a:r>
               <a:rPr lang="en-US" dirty="0" smtClean="0"/>
               <a:t>Save your lives</a:t>
             </a:r>
-            <a:endParaRPr lang="en-US" dirty="0" smtClean="0"/>
           </a:p>
           <a:p>
             <a:r>
               <a:rPr lang="en-US" dirty="0" smtClean="0"/>
               <a:t>Make high scores</a:t>
             </a:r>
-            <a:endParaRPr lang="en-US" dirty="0" smtClean="0"/>
           </a:p>
         </p:txBody>
       </p:sp>
@@ -7439,18 +7227,9 @@
   <p:clrMapOvr>
     <a:masterClrMapping/>
   </p:clrMapOvr>
-  <mc:AlternateContent xmlns:mc="http://schemas.openxmlformats.org/markup-compatibility/2006" xmlns:p14="http://schemas.microsoft.com/office/powerpoint/2010/main">
-    <mc:Choice Requires="p14">
-      <p:transition spd="slow" p14:dur="4000">
-        <p14:vortex dir="r"/>
-      </p:transition>
-    </mc:Choice>
-    <mc:Fallback xmlns="">
-      <p:transition spd="slow">
-        <p:fade/>
-      </p:transition>
-    </mc:Fallback>
-  </mc:AlternateContent>
+  <p:transition spd="slow">
+    <p:push dir="u"/>
+  </p:transition>
   <p:timing>
     <p:tnLst>
       <p:par>
@@ -7555,18 +7334,9 @@
   <p:clrMapOvr>
     <a:masterClrMapping/>
   </p:clrMapOvr>
-  <mc:AlternateContent xmlns:mc="http://schemas.openxmlformats.org/markup-compatibility/2006" xmlns:p14="http://schemas.microsoft.com/office/powerpoint/2010/main">
-    <mc:Choice Requires="p14">
-      <p:transition spd="slow" p14:dur="4000">
-        <p14:vortex dir="r"/>
-      </p:transition>
-    </mc:Choice>
-    <mc:Fallback xmlns="">
-      <p:transition spd="slow">
-        <p:fade/>
-      </p:transition>
-    </mc:Fallback>
-  </mc:AlternateContent>
+  <p:transition spd="slow">
+    <p:push dir="u"/>
+  </p:transition>
   <p:timing>
     <p:tnLst>
       <p:par>

</xml_diff>